<commit_message>
update .pptx & .pdf (descente de gradient)
</commit_message>
<xml_diff>
--- a/Intelligence Artificielle et Analyse de donnees.pptx
+++ b/Intelligence Artificielle et Analyse de donnees.pptx
@@ -122,6 +122,22 @@
       </a:defRPr>
     </a:lvl9pPr>
   </p:defaultTextStyle>
+  <p:extLst>
+    <p:ext uri="{EFAFB233-063F-42B5-8137-9DF3F51BA10A}">
+      <p15:sldGuideLst xmlns:p15="http://schemas.microsoft.com/office/powerpoint/2012/main">
+        <p15:guide id="1" orient="horz" pos="2160" userDrawn="1">
+          <p15:clr>
+            <a:srgbClr val="A4A3A4"/>
+          </p15:clr>
+        </p15:guide>
+        <p15:guide id="2" pos="3840" userDrawn="1">
+          <p15:clr>
+            <a:srgbClr val="A4A3A4"/>
+          </p15:clr>
+        </p15:guide>
+      </p15:sldGuideLst>
+    </p:ext>
+  </p:extLst>
 </p:presentation>
 </file>
 
@@ -272,7 +288,7 @@
           <a:p>
             <a:fld id="{6744C8BF-8EDA-4728-ABB9-9DEA91F7FC64}" type="datetimeFigureOut">
               <a:rPr lang="fr-FR" smtClean="0"/>
-              <a:t>15/01/2025</a:t>
+              <a:t>16/01/2025</a:t>
             </a:fld>
             <a:endParaRPr lang="fr-FR"/>
           </a:p>
@@ -470,7 +486,7 @@
           <a:p>
             <a:fld id="{6744C8BF-8EDA-4728-ABB9-9DEA91F7FC64}" type="datetimeFigureOut">
               <a:rPr lang="fr-FR" smtClean="0"/>
-              <a:t>15/01/2025</a:t>
+              <a:t>16/01/2025</a:t>
             </a:fld>
             <a:endParaRPr lang="fr-FR"/>
           </a:p>
@@ -678,7 +694,7 @@
           <a:p>
             <a:fld id="{6744C8BF-8EDA-4728-ABB9-9DEA91F7FC64}" type="datetimeFigureOut">
               <a:rPr lang="fr-FR" smtClean="0"/>
-              <a:t>15/01/2025</a:t>
+              <a:t>16/01/2025</a:t>
             </a:fld>
             <a:endParaRPr lang="fr-FR"/>
           </a:p>
@@ -876,7 +892,7 @@
           <a:p>
             <a:fld id="{6744C8BF-8EDA-4728-ABB9-9DEA91F7FC64}" type="datetimeFigureOut">
               <a:rPr lang="fr-FR" smtClean="0"/>
-              <a:t>15/01/2025</a:t>
+              <a:t>16/01/2025</a:t>
             </a:fld>
             <a:endParaRPr lang="fr-FR"/>
           </a:p>
@@ -1151,7 +1167,7 @@
           <a:p>
             <a:fld id="{6744C8BF-8EDA-4728-ABB9-9DEA91F7FC64}" type="datetimeFigureOut">
               <a:rPr lang="fr-FR" smtClean="0"/>
-              <a:t>15/01/2025</a:t>
+              <a:t>16/01/2025</a:t>
             </a:fld>
             <a:endParaRPr lang="fr-FR"/>
           </a:p>
@@ -1416,7 +1432,7 @@
           <a:p>
             <a:fld id="{6744C8BF-8EDA-4728-ABB9-9DEA91F7FC64}" type="datetimeFigureOut">
               <a:rPr lang="fr-FR" smtClean="0"/>
-              <a:t>15/01/2025</a:t>
+              <a:t>16/01/2025</a:t>
             </a:fld>
             <a:endParaRPr lang="fr-FR"/>
           </a:p>
@@ -1828,7 +1844,7 @@
           <a:p>
             <a:fld id="{6744C8BF-8EDA-4728-ABB9-9DEA91F7FC64}" type="datetimeFigureOut">
               <a:rPr lang="fr-FR" smtClean="0"/>
-              <a:t>15/01/2025</a:t>
+              <a:t>16/01/2025</a:t>
             </a:fld>
             <a:endParaRPr lang="fr-FR"/>
           </a:p>
@@ -1969,7 +1985,7 @@
           <a:p>
             <a:fld id="{6744C8BF-8EDA-4728-ABB9-9DEA91F7FC64}" type="datetimeFigureOut">
               <a:rPr lang="fr-FR" smtClean="0"/>
-              <a:t>15/01/2025</a:t>
+              <a:t>16/01/2025</a:t>
             </a:fld>
             <a:endParaRPr lang="fr-FR"/>
           </a:p>
@@ -2082,7 +2098,7 @@
           <a:p>
             <a:fld id="{6744C8BF-8EDA-4728-ABB9-9DEA91F7FC64}" type="datetimeFigureOut">
               <a:rPr lang="fr-FR" smtClean="0"/>
-              <a:t>15/01/2025</a:t>
+              <a:t>16/01/2025</a:t>
             </a:fld>
             <a:endParaRPr lang="fr-FR"/>
           </a:p>
@@ -2393,7 +2409,7 @@
           <a:p>
             <a:fld id="{6744C8BF-8EDA-4728-ABB9-9DEA91F7FC64}" type="datetimeFigureOut">
               <a:rPr lang="fr-FR" smtClean="0"/>
-              <a:t>15/01/2025</a:t>
+              <a:t>16/01/2025</a:t>
             </a:fld>
             <a:endParaRPr lang="fr-FR"/>
           </a:p>
@@ -2681,7 +2697,7 @@
           <a:p>
             <a:fld id="{6744C8BF-8EDA-4728-ABB9-9DEA91F7FC64}" type="datetimeFigureOut">
               <a:rPr lang="fr-FR" smtClean="0"/>
-              <a:t>15/01/2025</a:t>
+              <a:t>16/01/2025</a:t>
             </a:fld>
             <a:endParaRPr lang="fr-FR"/>
           </a:p>
@@ -2922,7 +2938,7 @@
           <a:p>
             <a:fld id="{6744C8BF-8EDA-4728-ABB9-9DEA91F7FC64}" type="datetimeFigureOut">
               <a:rPr lang="fr-FR" smtClean="0"/>
-              <a:t>15/01/2025</a:t>
+              <a:t>16/01/2025</a:t>
             </a:fld>
             <a:endParaRPr lang="fr-FR"/>
           </a:p>
@@ -3531,7 +3547,7 @@
                   </a:schemeClr>
                 </a:solidFill>
               </a:rPr>
-              <a:t>Quel ordre M choisir pour le polynôme ?</a:t>
+              <a:t>Quel ordre M choisir pour notre polynôme ?</a:t>
             </a:r>
           </a:p>
         </p:txBody>
@@ -3864,42 +3880,18 @@
               <a:buNone/>
             </a:pPr>
             <a:r>
-              <a:rPr lang="fr-FR" dirty="0">
-                <a:solidFill>
-                  <a:schemeClr val="bg2">
-                    <a:lumMod val="50000"/>
-                  </a:schemeClr>
-                </a:solidFill>
-              </a:rPr>
+              <a:rPr lang="fr-FR" dirty="0"/>
               <a:t>Remarque (</a:t>
             </a:r>
             <a:r>
-              <a:rPr lang="fr-FR" b="1" dirty="0">
-                <a:solidFill>
-                  <a:schemeClr val="bg2">
-                    <a:lumMod val="50000"/>
-                  </a:schemeClr>
-                </a:solidFill>
-              </a:rPr>
+              <a:rPr lang="fr-FR" b="1" dirty="0"/>
               <a:t>polynômes de Lagrange</a:t>
             </a:r>
             <a:r>
-              <a:rPr lang="fr-FR" dirty="0">
-                <a:solidFill>
-                  <a:schemeClr val="bg2">
-                    <a:lumMod val="50000"/>
-                  </a:schemeClr>
-                </a:solidFill>
-              </a:rPr>
+              <a:rPr lang="fr-FR" dirty="0"/>
               <a:t>) : pour n données distinctes il existe un (unique) polynôme d’ordre n-1 qui passe exactement par chaque donnée.</a:t>
             </a:r>
-            <a:endParaRPr lang="fr-FR" sz="2000" dirty="0">
-              <a:solidFill>
-                <a:schemeClr val="bg2">
-                  <a:lumMod val="50000"/>
-                </a:schemeClr>
-              </a:solidFill>
-            </a:endParaRPr>
+            <a:endParaRPr lang="fr-FR" sz="2000" dirty="0"/>
           </a:p>
         </p:txBody>
       </p:sp>
@@ -3933,8 +3925,8 @@
           <a:chExt cx="0" cy="0"/>
         </a:xfrm>
       </p:grpSpPr>
-      <mc:AlternateContent xmlns:mc="http://schemas.openxmlformats.org/markup-compatibility/2006">
-        <mc:Choice xmlns:a14="http://schemas.microsoft.com/office/drawing/2010/main" Requires="a14">
+      <mc:AlternateContent xmlns:mc="http://schemas.openxmlformats.org/markup-compatibility/2006" xmlns:a14="http://schemas.microsoft.com/office/drawing/2010/main">
+        <mc:Choice Requires="a14">
           <p:sp>
             <p:nvSpPr>
               <p:cNvPr id="3" name="Espace réservé du contenu 2">
@@ -4113,7 +4105,7 @@
             </p:txBody>
           </p:sp>
         </mc:Choice>
-        <mc:Fallback>
+        <mc:Fallback xmlns="">
           <p:sp>
             <p:nvSpPr>
               <p:cNvPr id="3" name="Espace réservé du contenu 2">
@@ -4615,8 +4607,8 @@
           <a:chExt cx="0" cy="0"/>
         </a:xfrm>
       </p:grpSpPr>
-      <mc:AlternateContent xmlns:mc="http://schemas.openxmlformats.org/markup-compatibility/2006">
-        <mc:Choice xmlns:a14="http://schemas.microsoft.com/office/drawing/2010/main" Requires="a14">
+      <mc:AlternateContent xmlns:mc="http://schemas.openxmlformats.org/markup-compatibility/2006" xmlns:a14="http://schemas.microsoft.com/office/drawing/2010/main">
+        <mc:Choice Requires="a14">
           <p:sp>
             <p:nvSpPr>
               <p:cNvPr id="3" name="Espace réservé du contenu 2">
@@ -4775,7 +4767,7 @@
             </p:txBody>
           </p:sp>
         </mc:Choice>
-        <mc:Fallback>
+        <mc:Fallback xmlns="">
           <p:sp>
             <p:nvSpPr>
               <p:cNvPr id="3" name="Espace réservé du contenu 2">
@@ -4908,13 +4900,7 @@
                   <a:buNone/>
                 </a:pPr>
                 <a:r>
-                  <a:rPr lang="fr-FR" sz="1800" dirty="0">
-                    <a:solidFill>
-                      <a:schemeClr val="bg2">
-                        <a:lumMod val="50000"/>
-                      </a:schemeClr>
-                    </a:solidFill>
-                  </a:rPr>
+                  <a:rPr lang="fr-FR" sz="2000" dirty="0"/>
                   <a:t>Générer et visualiser un jeu de données similaire à l’exemple ci-dessus.</a:t>
                 </a:r>
               </a:p>
@@ -5395,21 +5381,6 @@
                     </a:solidFill>
                   </a:rPr>
                   <a:t> pour utiliser une distribution uniforme.</a:t>
-                </a:r>
-              </a:p>
-              <a:p>
-                <a:pPr marL="457200" lvl="1" indent="0">
-                  <a:buNone/>
-                </a:pPr>
-                <a:r>
-                  <a:rPr lang="fr-FR" sz="1400" dirty="0">
-                    <a:solidFill>
-                      <a:schemeClr val="bg2">
-                        <a:lumMod val="50000"/>
-                      </a:schemeClr>
-                    </a:solidFill>
-                  </a:rPr>
-                  <a:t>Ordonner les données par ordre croissant.</a:t>
                 </a:r>
               </a:p>
               <a:p>
@@ -5973,7 +5944,7 @@
         </p:blipFill>
         <p:spPr>
           <a:xfrm>
-            <a:off x="4713668" y="4389948"/>
+            <a:off x="4819415" y="4271760"/>
             <a:ext cx="3006492" cy="2340104"/>
           </a:xfrm>
           <a:prstGeom prst="rect">
@@ -6011,83 +5982,1246 @@
           <a:chExt cx="0" cy="0"/>
         </a:xfrm>
       </p:grpSpPr>
-      <p:sp>
-        <p:nvSpPr>
-          <p:cNvPr id="3" name="Espace réservé du contenu 2">
+      <mc:AlternateContent xmlns:mc="http://schemas.openxmlformats.org/markup-compatibility/2006">
+        <mc:Choice xmlns:a14="http://schemas.microsoft.com/office/drawing/2010/main" Requires="a14">
+          <p:sp>
+            <p:nvSpPr>
+              <p:cNvPr id="3" name="Espace réservé du contenu 2">
+                <a:extLst>
+                  <a:ext uri="{FF2B5EF4-FFF2-40B4-BE49-F238E27FC236}">
+                    <a16:creationId xmlns:a16="http://schemas.microsoft.com/office/drawing/2014/main" id="{B59E77B8-2D75-472C-B76C-ABDDE0CAFCD5}"/>
+                  </a:ext>
+                </a:extLst>
+              </p:cNvPr>
+              <p:cNvSpPr>
+                <a:spLocks noGrp="1"/>
+              </p:cNvSpPr>
+              <p:nvPr>
+                <p:ph idx="1"/>
+              </p:nvPr>
+            </p:nvSpPr>
+            <p:spPr>
+              <a:xfrm>
+                <a:off x="537750" y="431073"/>
+                <a:ext cx="10839994" cy="6021978"/>
+              </a:xfrm>
+            </p:spPr>
+            <p:txBody>
+              <a:bodyPr>
+                <a:normAutofit/>
+              </a:bodyPr>
+              <a:lstStyle/>
+              <a:p>
+                <a:pPr marL="0" indent="0">
+                  <a:buNone/>
+                </a:pPr>
+                <a:r>
+                  <a:rPr lang="fr-FR" sz="2400" dirty="0"/>
+                  <a:t>3.3 Descente de gradient, dérivation automatique</a:t>
+                </a:r>
+              </a:p>
+              <a:p>
+                <a:pPr marL="0" indent="0">
+                  <a:buNone/>
+                </a:pPr>
+                <a:r>
+                  <a:rPr lang="fr-FR" sz="2000" u="sng" dirty="0"/>
+                  <a:t>Objectif</a:t>
+                </a:r>
+                <a:r>
+                  <a:rPr lang="fr-FR" sz="2000" dirty="0"/>
+                  <a:t> : minimiser la fonction coût </a:t>
+                </a:r>
+                <a14:m>
+                  <m:oMath xmlns:m="http://schemas.openxmlformats.org/officeDocument/2006/math">
+                    <m:r>
+                      <a:rPr lang="fr-FR" sz="2000" b="0" i="1" smtClean="0">
+                        <a:latin typeface="Cambria Math" panose="02040503050406030204" pitchFamily="18" charset="0"/>
+                      </a:rPr>
+                      <m:t>𝐿</m:t>
+                    </m:r>
+                  </m:oMath>
+                </a14:m>
+                <a:r>
+                  <a:rPr lang="fr-FR" sz="2000" dirty="0"/>
+                  <a:t>.</a:t>
+                </a:r>
+              </a:p>
+              <a:p>
+                <a:pPr marL="0" indent="0">
+                  <a:buNone/>
+                </a:pPr>
+                <a:r>
+                  <a:rPr lang="fr-FR" sz="2000" u="sng" dirty="0"/>
+                  <a:t>Idée</a:t>
+                </a:r>
+                <a:r>
+                  <a:rPr lang="fr-FR" sz="2000" dirty="0"/>
+                  <a:t> : mise à jour des paramètres, dans la direction qui fait diminuer </a:t>
+                </a:r>
+                <a14:m>
+                  <m:oMath xmlns:m="http://schemas.openxmlformats.org/officeDocument/2006/math">
+                    <m:r>
+                      <a:rPr lang="fr-FR" sz="2000" b="0" i="1" smtClean="0">
+                        <a:latin typeface="Cambria Math" panose="02040503050406030204" pitchFamily="18" charset="0"/>
+                      </a:rPr>
+                      <m:t>𝐿</m:t>
+                    </m:r>
+                  </m:oMath>
+                </a14:m>
+                <a:r>
+                  <a:rPr lang="fr-FR" sz="2000" dirty="0"/>
+                  <a:t> le plus fortement.</a:t>
+                </a:r>
+              </a:p>
+              <a:p>
+                <a:pPr marL="0" indent="0">
+                  <a:buNone/>
+                </a:pPr>
+                <a:r>
+                  <a:rPr lang="fr-FR" sz="2000" b="0" u="sng" dirty="0"/>
+                  <a:t>Mises à jour</a:t>
+                </a:r>
+                <a:r>
+                  <a:rPr lang="fr-FR" sz="2000" b="0" dirty="0"/>
+                  <a:t> :</a:t>
+                </a:r>
+                <a:endParaRPr lang="fr-FR" sz="2000" dirty="0"/>
+              </a:p>
+              <a:p>
+                <a:pPr marL="0" indent="0">
+                  <a:buNone/>
+                </a:pPr>
+                <a:endParaRPr lang="fr-FR" sz="2000" dirty="0"/>
+              </a:p>
+              <a:p>
+                <a:pPr marL="0" indent="0">
+                  <a:buNone/>
+                </a:pPr>
+                <a:endParaRPr lang="fr-FR" sz="2000" dirty="0"/>
+              </a:p>
+              <a:p>
+                <a:pPr marL="0" indent="0">
+                  <a:buNone/>
+                </a:pPr>
+                <a:endParaRPr lang="fr-FR" sz="2000" dirty="0"/>
+              </a:p>
+              <a:p>
+                <a:pPr marL="0" indent="0">
+                  <a:buNone/>
+                </a:pPr>
+                <a:r>
+                  <a:rPr lang="fr-FR" sz="2000" u="sng" dirty="0"/>
+                  <a:t>Convergence</a:t>
+                </a:r>
+                <a:r>
+                  <a:rPr lang="fr-FR" sz="2000" dirty="0"/>
+                  <a:t> : garantie pour un problème convexe, et </a:t>
+                </a:r>
+              </a:p>
+              <a:p>
+                <a:pPr marL="0" indent="0">
+                  <a:buNone/>
+                </a:pPr>
+                <a:r>
+                  <a:rPr lang="fr-FR" sz="2000" b="0" dirty="0"/>
+                  <a:t>pour </a:t>
+                </a:r>
+                <a14:m>
+                  <m:oMath xmlns:m="http://schemas.openxmlformats.org/officeDocument/2006/math">
+                    <m:r>
+                      <a:rPr lang="fr-FR" sz="2000" b="0" i="1" smtClean="0">
+                        <a:latin typeface="Cambria Math" panose="02040503050406030204" pitchFamily="18" charset="0"/>
+                      </a:rPr>
+                      <m:t>0&lt;</m:t>
+                    </m:r>
+                    <m:r>
+                      <a:rPr lang="fr-FR" sz="2000" b="0" i="1" smtClean="0">
+                        <a:latin typeface="Cambria Math" panose="02040503050406030204" pitchFamily="18" charset="0"/>
+                      </a:rPr>
+                      <m:t>𝜂</m:t>
+                    </m:r>
+                    <m:r>
+                      <a:rPr lang="fr-FR" sz="2000" b="0" i="1" smtClean="0">
+                        <a:latin typeface="Cambria Math" panose="02040503050406030204" pitchFamily="18" charset="0"/>
+                      </a:rPr>
+                      <m:t>&lt;</m:t>
+                    </m:r>
+                    <m:f>
+                      <m:fPr>
+                        <m:ctrlPr>
+                          <a:rPr lang="fr-FR" sz="2000" b="0" i="1" smtClean="0">
+                            <a:latin typeface="Cambria Math" panose="02040503050406030204" pitchFamily="18" charset="0"/>
+                          </a:rPr>
+                        </m:ctrlPr>
+                      </m:fPr>
+                      <m:num>
+                        <m:r>
+                          <a:rPr lang="fr-FR" sz="2000" b="0" i="1" smtClean="0">
+                            <a:latin typeface="Cambria Math" panose="02040503050406030204" pitchFamily="18" charset="0"/>
+                          </a:rPr>
+                          <m:t>2</m:t>
+                        </m:r>
+                      </m:num>
+                      <m:den>
+                        <m:r>
+                          <a:rPr lang="fr-FR" sz="2000" b="0" i="1" smtClean="0">
+                            <a:latin typeface="Cambria Math" panose="02040503050406030204" pitchFamily="18" charset="0"/>
+                          </a:rPr>
+                          <m:t>𝑘</m:t>
+                        </m:r>
+                      </m:den>
+                    </m:f>
+                  </m:oMath>
+                </a14:m>
+                <a:r>
+                  <a:rPr lang="fr-FR" sz="2000" dirty="0"/>
+                  <a:t> .</a:t>
+                </a:r>
+              </a:p>
+              <a:p>
+                <a:pPr marL="0" indent="0">
+                  <a:buNone/>
+                </a:pPr>
+                <a:r>
+                  <a:rPr lang="fr-FR" sz="2000" u="sng" dirty="0"/>
+                  <a:t>Illustration</a:t>
+                </a:r>
+                <a:r>
+                  <a:rPr lang="fr-FR" sz="2000" dirty="0"/>
+                  <a:t> (non convexe): </a:t>
+                </a:r>
+                <a14:m>
+                  <m:oMath xmlns:m="http://schemas.openxmlformats.org/officeDocument/2006/math">
+                    <m:sSub>
+                      <m:sSubPr>
+                        <m:ctrlPr>
+                          <a:rPr lang="fr-FR" sz="2000" b="0" i="1" smtClean="0">
+                            <a:latin typeface="Cambria Math" panose="02040503050406030204" pitchFamily="18" charset="0"/>
+                          </a:rPr>
+                        </m:ctrlPr>
+                      </m:sSubPr>
+                      <m:e>
+                        <m:r>
+                          <a:rPr lang="fr-FR" sz="2000" b="0" i="1" smtClean="0">
+                            <a:latin typeface="Cambria Math" panose="02040503050406030204" pitchFamily="18" charset="0"/>
+                          </a:rPr>
+                          <m:t>𝑊</m:t>
+                        </m:r>
+                      </m:e>
+                      <m:sub>
+                        <m:r>
+                          <a:rPr lang="fr-FR" sz="2000" b="0" i="1" smtClean="0">
+                            <a:latin typeface="Cambria Math" panose="02040503050406030204" pitchFamily="18" charset="0"/>
+                          </a:rPr>
+                          <m:t>𝑎</m:t>
+                        </m:r>
+                      </m:sub>
+                    </m:sSub>
+                  </m:oMath>
+                </a14:m>
+                <a:r>
+                  <a:rPr lang="fr-FR" sz="2000" dirty="0"/>
+                  <a:t> est un minimum local. </a:t>
+                </a:r>
+              </a:p>
+            </p:txBody>
+          </p:sp>
+        </mc:Choice>
+        <mc:Fallback>
+          <p:sp>
+            <p:nvSpPr>
+              <p:cNvPr id="3" name="Espace réservé du contenu 2">
+                <a:extLst>
+                  <a:ext uri="{FF2B5EF4-FFF2-40B4-BE49-F238E27FC236}">
+                    <a16:creationId xmlns:a16="http://schemas.microsoft.com/office/drawing/2014/main" id="{B59E77B8-2D75-472C-B76C-ABDDE0CAFCD5}"/>
+                  </a:ext>
+                </a:extLst>
+              </p:cNvPr>
+              <p:cNvSpPr>
+                <a:spLocks noGrp="1" noRot="1" noChangeAspect="1" noMove="1" noResize="1" noEditPoints="1" noAdjustHandles="1" noChangeArrowheads="1" noChangeShapeType="1" noTextEdit="1"/>
+              </p:cNvSpPr>
+              <p:nvPr>
+                <p:ph idx="1"/>
+              </p:nvPr>
+            </p:nvSpPr>
+            <p:spPr>
+              <a:xfrm>
+                <a:off x="537750" y="431073"/>
+                <a:ext cx="10839994" cy="6021978"/>
+              </a:xfrm>
+              <a:blipFill>
+                <a:blip r:embed="rId2"/>
+                <a:stretch>
+                  <a:fillRect l="-844" t="-1417"/>
+                </a:stretch>
+              </a:blipFill>
+            </p:spPr>
+            <p:txBody>
+              <a:bodyPr/>
+              <a:lstStyle/>
+              <a:p>
+                <a:r>
+                  <a:rPr lang="fr-FR">
+                    <a:noFill/>
+                  </a:rPr>
+                  <a:t> </a:t>
+                </a:r>
+              </a:p>
+            </p:txBody>
+          </p:sp>
+        </mc:Fallback>
+      </mc:AlternateContent>
+      <p:grpSp>
+        <p:nvGrpSpPr>
+          <p:cNvPr id="8" name="Groupe 7">
             <a:extLst>
               <a:ext uri="{FF2B5EF4-FFF2-40B4-BE49-F238E27FC236}">
-                <a16:creationId xmlns:a16="http://schemas.microsoft.com/office/drawing/2014/main" id="{B59E77B8-2D75-472C-B76C-ABDDE0CAFCD5}"/>
+                <a16:creationId xmlns:a16="http://schemas.microsoft.com/office/drawing/2014/main" id="{3FD39170-8A7C-4319-B068-253794F8930C}"/>
               </a:ext>
             </a:extLst>
           </p:cNvPr>
-          <p:cNvSpPr>
-            <a:spLocks noGrp="1"/>
-          </p:cNvSpPr>
-          <p:nvPr>
-            <p:ph idx="1"/>
-          </p:nvPr>
-        </p:nvSpPr>
-        <p:spPr>
+          <p:cNvGrpSpPr/>
+          <p:nvPr/>
+        </p:nvGrpSpPr>
+        <p:grpSpPr>
           <a:xfrm>
-            <a:off x="537750" y="431073"/>
-            <a:ext cx="10839994" cy="6021978"/>
+            <a:off x="7750623" y="3290721"/>
+            <a:ext cx="3529907" cy="3440969"/>
+            <a:chOff x="4021202" y="1156995"/>
+            <a:chExt cx="3529907" cy="3440969"/>
           </a:xfrm>
-        </p:spPr>
-        <p:txBody>
-          <a:bodyPr>
-            <a:normAutofit/>
-          </a:bodyPr>
-          <a:lstStyle/>
-          <a:p>
-            <a:pPr marL="0" indent="0">
-              <a:buNone/>
-            </a:pPr>
-            <a:r>
-              <a:rPr lang="fr-FR" sz="2200" dirty="0"/>
-              <a:t>Algorithme de descente de gradient</a:t>
-            </a:r>
-          </a:p>
-          <a:p>
-            <a:pPr marL="0" indent="0">
-              <a:buNone/>
-            </a:pPr>
-            <a:endParaRPr lang="fr-FR" sz="2200" dirty="0"/>
-          </a:p>
-          <a:p>
-            <a:pPr marL="0" indent="0">
-              <a:buNone/>
-            </a:pPr>
-            <a:endParaRPr lang="fr-FR" sz="2200" dirty="0"/>
-          </a:p>
-          <a:p>
-            <a:pPr marL="0" indent="0">
-              <a:buNone/>
-            </a:pPr>
-            <a:r>
-              <a:rPr lang="fr-FR" sz="2200" dirty="0"/>
-              <a:t>Calcul du gradient</a:t>
-            </a:r>
-          </a:p>
-          <a:p>
-            <a:pPr marL="0" indent="0">
-              <a:buNone/>
-            </a:pPr>
-            <a:r>
-              <a:rPr lang="fr-FR" sz="2200" dirty="0"/>
-              <a:t>	Approx (différence finie)</a:t>
-            </a:r>
-          </a:p>
-          <a:p>
-            <a:pPr marL="0" indent="0">
-              <a:buNone/>
-            </a:pPr>
-            <a:r>
-              <a:rPr lang="fr-FR" sz="2200" dirty="0"/>
-              <a:t>	Exacte (auto-différentiation)</a:t>
-            </a:r>
-          </a:p>
-        </p:txBody>
-      </p:sp>
+        </p:grpSpPr>
+        <p:pic>
+          <p:nvPicPr>
+            <p:cNvPr id="9" name="Image 8">
+              <a:extLst>
+                <a:ext uri="{FF2B5EF4-FFF2-40B4-BE49-F238E27FC236}">
+                  <a16:creationId xmlns:a16="http://schemas.microsoft.com/office/drawing/2014/main" id="{E839BE67-BFFF-4D6C-B978-D2747C170C0E}"/>
+                </a:ext>
+              </a:extLst>
+            </p:cNvPr>
+            <p:cNvPicPr>
+              <a:picLocks noChangeAspect="1"/>
+            </p:cNvPicPr>
+            <p:nvPr/>
+          </p:nvPicPr>
+          <p:blipFill>
+            <a:blip r:embed="rId3"/>
+            <a:stretch>
+              <a:fillRect/>
+            </a:stretch>
+          </p:blipFill>
+          <p:spPr>
+            <a:xfrm>
+              <a:off x="4021202" y="1156995"/>
+              <a:ext cx="3529907" cy="3409373"/>
+            </a:xfrm>
+            <a:prstGeom prst="rect">
+              <a:avLst/>
+            </a:prstGeom>
+          </p:spPr>
+        </p:pic>
+        <mc:AlternateContent xmlns:mc="http://schemas.openxmlformats.org/markup-compatibility/2006">
+          <mc:Choice xmlns:a14="http://schemas.microsoft.com/office/drawing/2010/main" Requires="a14">
+            <p:sp>
+              <p:nvSpPr>
+                <p:cNvPr id="10" name="ZoneTexte 9">
+                  <a:extLst>
+                    <a:ext uri="{FF2B5EF4-FFF2-40B4-BE49-F238E27FC236}">
+                      <a16:creationId xmlns:a16="http://schemas.microsoft.com/office/drawing/2014/main" id="{28FB2AF9-852C-4719-AF95-FC3E87F08062}"/>
+                    </a:ext>
+                  </a:extLst>
+                </p:cNvPr>
+                <p:cNvSpPr txBox="1"/>
+                <p:nvPr/>
+              </p:nvSpPr>
+              <p:spPr>
+                <a:xfrm>
+                  <a:off x="4603104" y="1175662"/>
+                  <a:ext cx="365741" cy="369332"/>
+                </a:xfrm>
+                <a:prstGeom prst="rect">
+                  <a:avLst/>
+                </a:prstGeom>
+                <a:noFill/>
+              </p:spPr>
+              <p:txBody>
+                <a:bodyPr wrap="none" rtlCol="0">
+                  <a:spAutoFit/>
+                </a:bodyPr>
+                <a:lstStyle/>
+                <a:p>
+                  <a14:m>
+                    <m:oMathPara xmlns:m="http://schemas.openxmlformats.org/officeDocument/2006/math">
+                      <m:oMathParaPr>
+                        <m:jc m:val="centerGroup"/>
+                      </m:oMathParaPr>
+                      <m:oMath xmlns:m="http://schemas.openxmlformats.org/officeDocument/2006/math">
+                        <m:r>
+                          <a:rPr lang="fr-FR" b="0" i="1" smtClean="0">
+                            <a:latin typeface="Cambria Math" panose="02040503050406030204" pitchFamily="18" charset="0"/>
+                          </a:rPr>
+                          <m:t>𝐿</m:t>
+                        </m:r>
+                      </m:oMath>
+                    </m:oMathPara>
+                  </a14:m>
+                  <a:endParaRPr lang="fr-FR" dirty="0"/>
+                </a:p>
+              </p:txBody>
+            </p:sp>
+          </mc:Choice>
+          <mc:Fallback>
+            <p:sp>
+              <p:nvSpPr>
+                <p:cNvPr id="10" name="ZoneTexte 9">
+                  <a:extLst>
+                    <a:ext uri="{FF2B5EF4-FFF2-40B4-BE49-F238E27FC236}">
+                      <a16:creationId xmlns:a16="http://schemas.microsoft.com/office/drawing/2014/main" id="{28FB2AF9-852C-4719-AF95-FC3E87F08062}"/>
+                    </a:ext>
+                  </a:extLst>
+                </p:cNvPr>
+                <p:cNvSpPr txBox="1">
+                  <a:spLocks noRot="1" noChangeAspect="1" noMove="1" noResize="1" noEditPoints="1" noAdjustHandles="1" noChangeArrowheads="1" noChangeShapeType="1" noTextEdit="1"/>
+                </p:cNvSpPr>
+                <p:nvPr/>
+              </p:nvSpPr>
+              <p:spPr>
+                <a:xfrm>
+                  <a:off x="4603104" y="1175662"/>
+                  <a:ext cx="365741" cy="369332"/>
+                </a:xfrm>
+                <a:prstGeom prst="rect">
+                  <a:avLst/>
+                </a:prstGeom>
+                <a:blipFill>
+                  <a:blip r:embed="rId4"/>
+                  <a:stretch>
+                    <a:fillRect/>
+                  </a:stretch>
+                </a:blipFill>
+              </p:spPr>
+              <p:txBody>
+                <a:bodyPr/>
+                <a:lstStyle/>
+                <a:p>
+                  <a:r>
+                    <a:rPr lang="fr-FR">
+                      <a:noFill/>
+                    </a:rPr>
+                    <a:t> </a:t>
+                  </a:r>
+                </a:p>
+              </p:txBody>
+            </p:sp>
+          </mc:Fallback>
+        </mc:AlternateContent>
+        <mc:AlternateContent xmlns:mc="http://schemas.openxmlformats.org/markup-compatibility/2006">
+          <mc:Choice xmlns:a14="http://schemas.microsoft.com/office/drawing/2010/main" Requires="a14">
+            <p:sp>
+              <p:nvSpPr>
+                <p:cNvPr id="11" name="ZoneTexte 10">
+                  <a:extLst>
+                    <a:ext uri="{FF2B5EF4-FFF2-40B4-BE49-F238E27FC236}">
+                      <a16:creationId xmlns:a16="http://schemas.microsoft.com/office/drawing/2014/main" id="{D7172D10-0D50-45ED-8A4B-651A6DF69064}"/>
+                    </a:ext>
+                  </a:extLst>
+                </p:cNvPr>
+                <p:cNvSpPr txBox="1"/>
+                <p:nvPr/>
+              </p:nvSpPr>
+              <p:spPr>
+                <a:xfrm>
+                  <a:off x="6733594" y="4262208"/>
+                  <a:ext cx="365741" cy="335756"/>
+                </a:xfrm>
+                <a:prstGeom prst="rect">
+                  <a:avLst/>
+                </a:prstGeom>
+                <a:noFill/>
+              </p:spPr>
+              <p:txBody>
+                <a:bodyPr wrap="none" rtlCol="0">
+                  <a:spAutoFit/>
+                </a:bodyPr>
+                <a:lstStyle/>
+                <a:p>
+                  <a14:m>
+                    <m:oMathPara xmlns:m="http://schemas.openxmlformats.org/officeDocument/2006/math">
+                      <m:oMathParaPr>
+                        <m:jc m:val="centerGroup"/>
+                      </m:oMathParaPr>
+                      <m:oMath xmlns:m="http://schemas.openxmlformats.org/officeDocument/2006/math">
+                        <m:r>
+                          <a:rPr lang="fr-FR" b="0" i="1" smtClean="0">
+                            <a:latin typeface="Cambria Math" panose="02040503050406030204" pitchFamily="18" charset="0"/>
+                          </a:rPr>
+                          <m:t>𝐿</m:t>
+                        </m:r>
+                      </m:oMath>
+                    </m:oMathPara>
+                  </a14:m>
+                  <a:endParaRPr lang="fr-FR" dirty="0"/>
+                </a:p>
+              </p:txBody>
+            </p:sp>
+          </mc:Choice>
+          <mc:Fallback>
+            <p:sp>
+              <p:nvSpPr>
+                <p:cNvPr id="11" name="ZoneTexte 10">
+                  <a:extLst>
+                    <a:ext uri="{FF2B5EF4-FFF2-40B4-BE49-F238E27FC236}">
+                      <a16:creationId xmlns:a16="http://schemas.microsoft.com/office/drawing/2014/main" id="{D7172D10-0D50-45ED-8A4B-651A6DF69064}"/>
+                    </a:ext>
+                  </a:extLst>
+                </p:cNvPr>
+                <p:cNvSpPr txBox="1">
+                  <a:spLocks noRot="1" noChangeAspect="1" noMove="1" noResize="1" noEditPoints="1" noAdjustHandles="1" noChangeArrowheads="1" noChangeShapeType="1" noTextEdit="1"/>
+                </p:cNvSpPr>
+                <p:nvPr/>
+              </p:nvSpPr>
+              <p:spPr>
+                <a:xfrm>
+                  <a:off x="6733594" y="4262208"/>
+                  <a:ext cx="365741" cy="335756"/>
+                </a:xfrm>
+                <a:prstGeom prst="rect">
+                  <a:avLst/>
+                </a:prstGeom>
+                <a:blipFill>
+                  <a:blip r:embed="rId5"/>
+                  <a:stretch>
+                    <a:fillRect b="-1818"/>
+                  </a:stretch>
+                </a:blipFill>
+              </p:spPr>
+              <p:txBody>
+                <a:bodyPr/>
+                <a:lstStyle/>
+                <a:p>
+                  <a:r>
+                    <a:rPr lang="fr-FR">
+                      <a:noFill/>
+                    </a:rPr>
+                    <a:t> </a:t>
+                  </a:r>
+                </a:p>
+              </p:txBody>
+            </p:sp>
+          </mc:Fallback>
+        </mc:AlternateContent>
+      </p:grpSp>
+      <p:grpSp>
+        <p:nvGrpSpPr>
+          <p:cNvPr id="12" name="Groupe 11">
+            <a:extLst>
+              <a:ext uri="{FF2B5EF4-FFF2-40B4-BE49-F238E27FC236}">
+                <a16:creationId xmlns:a16="http://schemas.microsoft.com/office/drawing/2014/main" id="{050A0599-BD1C-4124-A6AE-02D7653E9A43}"/>
+              </a:ext>
+            </a:extLst>
+          </p:cNvPr>
+          <p:cNvGrpSpPr/>
+          <p:nvPr/>
+        </p:nvGrpSpPr>
+        <p:grpSpPr>
+          <a:xfrm>
+            <a:off x="1915883" y="1831396"/>
+            <a:ext cx="6562525" cy="1284447"/>
+            <a:chOff x="3048000" y="3243420"/>
+            <a:chExt cx="6562525" cy="1284447"/>
+          </a:xfrm>
+        </p:grpSpPr>
+        <mc:AlternateContent xmlns:mc="http://schemas.openxmlformats.org/markup-compatibility/2006">
+          <mc:Choice xmlns:a14="http://schemas.microsoft.com/office/drawing/2010/main" Requires="a14">
+            <p:sp>
+              <p:nvSpPr>
+                <p:cNvPr id="13" name="ZoneTexte 12">
+                  <a:extLst>
+                    <a:ext uri="{FF2B5EF4-FFF2-40B4-BE49-F238E27FC236}">
+                      <a16:creationId xmlns:a16="http://schemas.microsoft.com/office/drawing/2014/main" id="{AFA4E859-17C2-44D1-B7C1-7A87D1CB6962}"/>
+                    </a:ext>
+                  </a:extLst>
+                </p:cNvPr>
+                <p:cNvSpPr txBox="1"/>
+                <p:nvPr/>
+              </p:nvSpPr>
+              <p:spPr>
+                <a:xfrm>
+                  <a:off x="3048000" y="3243420"/>
+                  <a:ext cx="6096000" cy="439736"/>
+                </a:xfrm>
+                <a:prstGeom prst="rect">
+                  <a:avLst/>
+                </a:prstGeom>
+                <a:noFill/>
+              </p:spPr>
+              <p:txBody>
+                <a:bodyPr wrap="square">
+                  <a:spAutoFit/>
+                </a:bodyPr>
+                <a:lstStyle/>
+                <a:p>
+                  <a:pPr marL="0" indent="0">
+                    <a:buNone/>
+                  </a:pPr>
+                  <a14:m>
+                    <m:oMathPara xmlns:m="http://schemas.openxmlformats.org/officeDocument/2006/math">
+                      <m:oMathParaPr>
+                        <m:jc m:val="centerGroup"/>
+                      </m:oMathParaPr>
+                      <m:oMath xmlns:m="http://schemas.openxmlformats.org/officeDocument/2006/math">
+                        <m:sSup>
+                          <m:sSupPr>
+                            <m:ctrlPr>
+                              <a:rPr lang="fr-FR" sz="2000" b="0" i="1" smtClean="0">
+                                <a:latin typeface="Cambria Math" panose="02040503050406030204" pitchFamily="18" charset="0"/>
+                              </a:rPr>
+                            </m:ctrlPr>
+                          </m:sSupPr>
+                          <m:e>
+                            <m:r>
+                              <a:rPr lang="fr-FR" sz="2000" b="0" i="1" smtClean="0">
+                                <a:latin typeface="Cambria Math" panose="02040503050406030204" pitchFamily="18" charset="0"/>
+                              </a:rPr>
+                              <m:t>𝜃</m:t>
+                            </m:r>
+                          </m:e>
+                          <m:sup>
+                            <m:r>
+                              <a:rPr lang="fr-FR" sz="2000" b="0" i="1" smtClean="0">
+                                <a:latin typeface="Cambria Math" panose="02040503050406030204" pitchFamily="18" charset="0"/>
+                              </a:rPr>
+                              <m:t>𝑘</m:t>
+                            </m:r>
+                            <m:r>
+                              <a:rPr lang="fr-FR" sz="2000" b="0" i="1" smtClean="0">
+                                <a:latin typeface="Cambria Math" panose="02040503050406030204" pitchFamily="18" charset="0"/>
+                              </a:rPr>
+                              <m:t>+1</m:t>
+                            </m:r>
+                          </m:sup>
+                        </m:sSup>
+                        <m:r>
+                          <a:rPr lang="fr-FR" sz="2000" b="0" i="1" smtClean="0">
+                            <a:latin typeface="Cambria Math" panose="02040503050406030204" pitchFamily="18" charset="0"/>
+                          </a:rPr>
+                          <m:t>=</m:t>
+                        </m:r>
+                        <m:sSup>
+                          <m:sSupPr>
+                            <m:ctrlPr>
+                              <a:rPr lang="fr-FR" sz="2000" b="0" i="1" smtClean="0">
+                                <a:latin typeface="Cambria Math" panose="02040503050406030204" pitchFamily="18" charset="0"/>
+                              </a:rPr>
+                            </m:ctrlPr>
+                          </m:sSupPr>
+                          <m:e>
+                            <m:r>
+                              <a:rPr lang="fr-FR" sz="2000" b="0" i="1" smtClean="0">
+                                <a:latin typeface="Cambria Math" panose="02040503050406030204" pitchFamily="18" charset="0"/>
+                              </a:rPr>
+                              <m:t>𝜃</m:t>
+                            </m:r>
+                          </m:e>
+                          <m:sup>
+                            <m:r>
+                              <a:rPr lang="fr-FR" sz="2000" b="0" i="1" smtClean="0">
+                                <a:latin typeface="Cambria Math" panose="02040503050406030204" pitchFamily="18" charset="0"/>
+                              </a:rPr>
+                              <m:t>𝑘</m:t>
+                            </m:r>
+                          </m:sup>
+                        </m:sSup>
+                        <m:r>
+                          <a:rPr lang="fr-FR" sz="2000" b="0" i="1" smtClean="0">
+                            <a:latin typeface="Cambria Math" panose="02040503050406030204" pitchFamily="18" charset="0"/>
+                          </a:rPr>
+                          <m:t>−</m:t>
+                        </m:r>
+                        <m:r>
+                          <a:rPr lang="fr-FR" sz="2000" b="0" i="1" smtClean="0">
+                            <a:latin typeface="Cambria Math" panose="02040503050406030204" pitchFamily="18" charset="0"/>
+                          </a:rPr>
+                          <m:t>𝜂</m:t>
+                        </m:r>
+                        <m:r>
+                          <a:rPr lang="fr-FR" sz="2000" b="0" i="1" smtClean="0">
+                            <a:latin typeface="Cambria Math" panose="02040503050406030204" pitchFamily="18" charset="0"/>
+                          </a:rPr>
+                          <m:t>.</m:t>
+                        </m:r>
+                        <m:sSub>
+                          <m:sSubPr>
+                            <m:ctrlPr>
+                              <a:rPr lang="fr-FR" sz="2000" b="0" i="1" smtClean="0">
+                                <a:latin typeface="Cambria Math" panose="02040503050406030204" pitchFamily="18" charset="0"/>
+                                <a:ea typeface="Cambria Math" panose="02040503050406030204" pitchFamily="18" charset="0"/>
+                              </a:rPr>
+                            </m:ctrlPr>
+                          </m:sSubPr>
+                          <m:e>
+                            <m:r>
+                              <m:rPr>
+                                <m:sty m:val="p"/>
+                              </m:rPr>
+                              <a:rPr lang="fr-FR" sz="2000" b="0" i="1" smtClean="0">
+                                <a:latin typeface="Cambria Math" panose="02040503050406030204" pitchFamily="18" charset="0"/>
+                                <a:ea typeface="Cambria Math" panose="02040503050406030204" pitchFamily="18" charset="0"/>
+                              </a:rPr>
+                              <m:t>∇</m:t>
+                            </m:r>
+                          </m:e>
+                          <m:sub>
+                            <m:r>
+                              <a:rPr lang="fr-FR" sz="2000" b="0" i="1" smtClean="0">
+                                <a:latin typeface="Cambria Math" panose="02040503050406030204" pitchFamily="18" charset="0"/>
+                                <a:ea typeface="Cambria Math" panose="02040503050406030204" pitchFamily="18" charset="0"/>
+                              </a:rPr>
+                              <m:t>𝜃</m:t>
+                            </m:r>
+                          </m:sub>
+                        </m:sSub>
+                        <m:r>
+                          <a:rPr lang="fr-FR" sz="2000" b="0" i="1" smtClean="0">
+                            <a:latin typeface="Cambria Math" panose="02040503050406030204" pitchFamily="18" charset="0"/>
+                            <a:ea typeface="Cambria Math" panose="02040503050406030204" pitchFamily="18" charset="0"/>
+                          </a:rPr>
+                          <m:t>𝐿</m:t>
+                        </m:r>
+                        <m:r>
+                          <a:rPr lang="fr-FR" sz="2000" b="0" i="1" smtClean="0">
+                            <a:latin typeface="Cambria Math" panose="02040503050406030204" pitchFamily="18" charset="0"/>
+                            <a:ea typeface="Cambria Math" panose="02040503050406030204" pitchFamily="18" charset="0"/>
+                          </a:rPr>
+                          <m:t>(</m:t>
+                        </m:r>
+                        <m:r>
+                          <a:rPr lang="fr-FR" sz="2000" b="0" i="1" smtClean="0">
+                            <a:latin typeface="Cambria Math" panose="02040503050406030204" pitchFamily="18" charset="0"/>
+                            <a:ea typeface="Cambria Math" panose="02040503050406030204" pitchFamily="18" charset="0"/>
+                          </a:rPr>
+                          <m:t>h</m:t>
+                        </m:r>
+                        <m:d>
+                          <m:dPr>
+                            <m:ctrlPr>
+                              <a:rPr lang="fr-FR" sz="2000" b="0" i="1" smtClean="0">
+                                <a:latin typeface="Cambria Math" panose="02040503050406030204" pitchFamily="18" charset="0"/>
+                                <a:ea typeface="Cambria Math" panose="02040503050406030204" pitchFamily="18" charset="0"/>
+                              </a:rPr>
+                            </m:ctrlPr>
+                          </m:dPr>
+                          <m:e>
+                            <m:r>
+                              <a:rPr lang="fr-FR" sz="2000" b="0" i="1" smtClean="0">
+                                <a:latin typeface="Cambria Math" panose="02040503050406030204" pitchFamily="18" charset="0"/>
+                                <a:ea typeface="Cambria Math" panose="02040503050406030204" pitchFamily="18" charset="0"/>
+                              </a:rPr>
+                              <m:t>𝑥</m:t>
+                            </m:r>
+                            <m:r>
+                              <a:rPr lang="fr-FR" sz="2000" b="0" i="1" smtClean="0">
+                                <a:latin typeface="Cambria Math" panose="02040503050406030204" pitchFamily="18" charset="0"/>
+                                <a:ea typeface="Cambria Math" panose="02040503050406030204" pitchFamily="18" charset="0"/>
+                              </a:rPr>
+                              <m:t>,</m:t>
+                            </m:r>
+                            <m:sSup>
+                              <m:sSupPr>
+                                <m:ctrlPr>
+                                  <a:rPr lang="fr-FR" sz="2000" b="0" i="1" smtClean="0">
+                                    <a:latin typeface="Cambria Math" panose="02040503050406030204" pitchFamily="18" charset="0"/>
+                                    <a:ea typeface="Cambria Math" panose="02040503050406030204" pitchFamily="18" charset="0"/>
+                                  </a:rPr>
+                                </m:ctrlPr>
+                              </m:sSupPr>
+                              <m:e>
+                                <m:r>
+                                  <a:rPr lang="fr-FR" sz="2000" b="0" i="1" smtClean="0">
+                                    <a:latin typeface="Cambria Math" panose="02040503050406030204" pitchFamily="18" charset="0"/>
+                                    <a:ea typeface="Cambria Math" panose="02040503050406030204" pitchFamily="18" charset="0"/>
+                                  </a:rPr>
+                                  <m:t>𝜃</m:t>
+                                </m:r>
+                              </m:e>
+                              <m:sup>
+                                <m:r>
+                                  <a:rPr lang="fr-FR" sz="2000" b="0" i="1" smtClean="0">
+                                    <a:latin typeface="Cambria Math" panose="02040503050406030204" pitchFamily="18" charset="0"/>
+                                    <a:ea typeface="Cambria Math" panose="02040503050406030204" pitchFamily="18" charset="0"/>
+                                  </a:rPr>
+                                  <m:t>𝑘</m:t>
+                                </m:r>
+                              </m:sup>
+                            </m:sSup>
+                          </m:e>
+                        </m:d>
+                        <m:r>
+                          <a:rPr lang="fr-FR" sz="2000" b="0" i="1" smtClean="0">
+                            <a:latin typeface="Cambria Math" panose="02040503050406030204" pitchFamily="18" charset="0"/>
+                            <a:ea typeface="Cambria Math" panose="02040503050406030204" pitchFamily="18" charset="0"/>
+                          </a:rPr>
+                          <m:t>, </m:t>
+                        </m:r>
+                        <m:r>
+                          <a:rPr lang="fr-FR" sz="2000" b="0" i="1" smtClean="0">
+                            <a:latin typeface="Cambria Math" panose="02040503050406030204" pitchFamily="18" charset="0"/>
+                            <a:ea typeface="Cambria Math" panose="02040503050406030204" pitchFamily="18" charset="0"/>
+                          </a:rPr>
+                          <m:t>𝑦</m:t>
+                        </m:r>
+                        <m:r>
+                          <a:rPr lang="fr-FR" sz="2000" b="0" i="1" smtClean="0">
+                            <a:latin typeface="Cambria Math" panose="02040503050406030204" pitchFamily="18" charset="0"/>
+                            <a:ea typeface="Cambria Math" panose="02040503050406030204" pitchFamily="18" charset="0"/>
+                          </a:rPr>
+                          <m:t>)</m:t>
+                        </m:r>
+                      </m:oMath>
+                    </m:oMathPara>
+                  </a14:m>
+                  <a:endParaRPr lang="fr-FR" sz="2000" dirty="0"/>
+                </a:p>
+              </p:txBody>
+            </p:sp>
+          </mc:Choice>
+          <mc:Fallback>
+            <p:sp>
+              <p:nvSpPr>
+                <p:cNvPr id="13" name="ZoneTexte 12">
+                  <a:extLst>
+                    <a:ext uri="{FF2B5EF4-FFF2-40B4-BE49-F238E27FC236}">
+                      <a16:creationId xmlns:a16="http://schemas.microsoft.com/office/drawing/2014/main" id="{AFA4E859-17C2-44D1-B7C1-7A87D1CB6962}"/>
+                    </a:ext>
+                  </a:extLst>
+                </p:cNvPr>
+                <p:cNvSpPr txBox="1">
+                  <a:spLocks noRot="1" noChangeAspect="1" noMove="1" noResize="1" noEditPoints="1" noAdjustHandles="1" noChangeArrowheads="1" noChangeShapeType="1" noTextEdit="1"/>
+                </p:cNvSpPr>
+                <p:nvPr/>
+              </p:nvSpPr>
+              <p:spPr>
+                <a:xfrm>
+                  <a:off x="3048000" y="3243420"/>
+                  <a:ext cx="6096000" cy="439736"/>
+                </a:xfrm>
+                <a:prstGeom prst="rect">
+                  <a:avLst/>
+                </a:prstGeom>
+                <a:blipFill>
+                  <a:blip r:embed="rId6"/>
+                  <a:stretch>
+                    <a:fillRect b="-9589"/>
+                  </a:stretch>
+                </a:blipFill>
+              </p:spPr>
+              <p:txBody>
+                <a:bodyPr/>
+                <a:lstStyle/>
+                <a:p>
+                  <a:r>
+                    <a:rPr lang="fr-FR">
+                      <a:noFill/>
+                    </a:rPr>
+                    <a:t> </a:t>
+                  </a:r>
+                </a:p>
+              </p:txBody>
+            </p:sp>
+          </mc:Fallback>
+        </mc:AlternateContent>
+        <p:cxnSp>
+          <p:nvCxnSpPr>
+            <p:cNvPr id="14" name="Connecteur droit avec flèche 13">
+              <a:extLst>
+                <a:ext uri="{FF2B5EF4-FFF2-40B4-BE49-F238E27FC236}">
+                  <a16:creationId xmlns:a16="http://schemas.microsoft.com/office/drawing/2014/main" id="{E0993E3E-1134-4CE5-99EC-10EAB14287ED}"/>
+                </a:ext>
+              </a:extLst>
+            </p:cNvPr>
+            <p:cNvCxnSpPr>
+              <a:cxnSpLocks/>
+            </p:cNvCxnSpPr>
+            <p:nvPr/>
+          </p:nvCxnSpPr>
+          <p:spPr>
+            <a:xfrm flipV="1">
+              <a:off x="4926563" y="3649045"/>
+              <a:ext cx="422988" cy="232490"/>
+            </a:xfrm>
+            <a:prstGeom prst="straightConnector1">
+              <a:avLst/>
+            </a:prstGeom>
+            <a:ln>
+              <a:tailEnd type="triangle"/>
+            </a:ln>
+          </p:spPr>
+          <p:style>
+            <a:lnRef idx="1">
+              <a:schemeClr val="accent1"/>
+            </a:lnRef>
+            <a:fillRef idx="0">
+              <a:schemeClr val="accent1"/>
+            </a:fillRef>
+            <a:effectRef idx="0">
+              <a:schemeClr val="accent1"/>
+            </a:effectRef>
+            <a:fontRef idx="minor">
+              <a:schemeClr val="tx1"/>
+            </a:fontRef>
+          </p:style>
+        </p:cxnSp>
+        <p:cxnSp>
+          <p:nvCxnSpPr>
+            <p:cNvPr id="15" name="Connecteur droit avec flèche 14">
+              <a:extLst>
+                <a:ext uri="{FF2B5EF4-FFF2-40B4-BE49-F238E27FC236}">
+                  <a16:creationId xmlns:a16="http://schemas.microsoft.com/office/drawing/2014/main" id="{D8C6B288-F6E2-4315-A676-3F24775C8B2F}"/>
+                </a:ext>
+              </a:extLst>
+            </p:cNvPr>
+            <p:cNvCxnSpPr>
+              <a:cxnSpLocks/>
+            </p:cNvCxnSpPr>
+            <p:nvPr/>
+          </p:nvCxnSpPr>
+          <p:spPr>
+            <a:xfrm flipV="1">
+              <a:off x="5896947" y="3649045"/>
+              <a:ext cx="0" cy="232490"/>
+            </a:xfrm>
+            <a:prstGeom prst="straightConnector1">
+              <a:avLst/>
+            </a:prstGeom>
+            <a:ln>
+              <a:tailEnd type="triangle"/>
+            </a:ln>
+          </p:spPr>
+          <p:style>
+            <a:lnRef idx="1">
+              <a:schemeClr val="accent1"/>
+            </a:lnRef>
+            <a:fillRef idx="0">
+              <a:schemeClr val="accent1"/>
+            </a:fillRef>
+            <a:effectRef idx="0">
+              <a:schemeClr val="accent1"/>
+            </a:effectRef>
+            <a:fontRef idx="minor">
+              <a:schemeClr val="tx1"/>
+            </a:fontRef>
+          </p:style>
+        </p:cxnSp>
+        <p:cxnSp>
+          <p:nvCxnSpPr>
+            <p:cNvPr id="16" name="Connecteur droit avec flèche 15">
+              <a:extLst>
+                <a:ext uri="{FF2B5EF4-FFF2-40B4-BE49-F238E27FC236}">
+                  <a16:creationId xmlns:a16="http://schemas.microsoft.com/office/drawing/2014/main" id="{60234177-53F7-49B9-B999-EE7F7FD47C39}"/>
+                </a:ext>
+              </a:extLst>
+            </p:cNvPr>
+            <p:cNvCxnSpPr>
+              <a:cxnSpLocks/>
+            </p:cNvCxnSpPr>
+            <p:nvPr/>
+          </p:nvCxnSpPr>
+          <p:spPr>
+            <a:xfrm flipH="1" flipV="1">
+              <a:off x="6394580" y="3649044"/>
+              <a:ext cx="503853" cy="232491"/>
+            </a:xfrm>
+            <a:prstGeom prst="straightConnector1">
+              <a:avLst/>
+            </a:prstGeom>
+            <a:ln>
+              <a:tailEnd type="triangle"/>
+            </a:ln>
+          </p:spPr>
+          <p:style>
+            <a:lnRef idx="1">
+              <a:schemeClr val="accent1"/>
+            </a:lnRef>
+            <a:fillRef idx="0">
+              <a:schemeClr val="accent1"/>
+            </a:fillRef>
+            <a:effectRef idx="0">
+              <a:schemeClr val="accent1"/>
+            </a:effectRef>
+            <a:fontRef idx="minor">
+              <a:schemeClr val="tx1"/>
+            </a:fontRef>
+          </p:style>
+        </p:cxnSp>
+        <p:sp>
+          <p:nvSpPr>
+            <p:cNvPr id="17" name="ZoneTexte 16">
+              <a:extLst>
+                <a:ext uri="{FF2B5EF4-FFF2-40B4-BE49-F238E27FC236}">
+                  <a16:creationId xmlns:a16="http://schemas.microsoft.com/office/drawing/2014/main" id="{455B07CC-F92E-45BD-A76C-5FA0D950B874}"/>
+                </a:ext>
+              </a:extLst>
+            </p:cNvPr>
+            <p:cNvSpPr txBox="1"/>
+            <p:nvPr/>
+          </p:nvSpPr>
+          <p:spPr>
+            <a:xfrm>
+              <a:off x="5461514" y="3881536"/>
+              <a:ext cx="1430694" cy="646331"/>
+            </a:xfrm>
+            <a:prstGeom prst="rect">
+              <a:avLst/>
+            </a:prstGeom>
+            <a:noFill/>
+          </p:spPr>
+          <p:txBody>
+            <a:bodyPr wrap="square" rtlCol="0">
+              <a:spAutoFit/>
+            </a:bodyPr>
+            <a:lstStyle/>
+            <a:p>
+              <a:r>
+                <a:rPr lang="fr-FR" dirty="0"/>
+                <a:t>Pas</a:t>
+              </a:r>
+              <a:r>
+                <a:rPr lang="fr-FR" i="1" dirty="0"/>
+                <a:t> (</a:t>
+              </a:r>
+              <a:r>
+                <a:rPr lang="fr-FR" i="1" dirty="0" err="1"/>
+                <a:t>learning</a:t>
+              </a:r>
+              <a:endParaRPr lang="fr-FR" i="1" dirty="0"/>
+            </a:p>
+            <a:p>
+              <a:r>
+                <a:rPr lang="fr-FR" i="1" dirty="0"/>
+                <a:t>rate)</a:t>
+              </a:r>
+            </a:p>
+          </p:txBody>
+        </p:sp>
+        <mc:AlternateContent xmlns:mc="http://schemas.openxmlformats.org/markup-compatibility/2006">
+          <mc:Choice xmlns:a14="http://schemas.microsoft.com/office/drawing/2010/main" Requires="a14">
+            <p:sp>
+              <p:nvSpPr>
+                <p:cNvPr id="18" name="ZoneTexte 17">
+                  <a:extLst>
+                    <a:ext uri="{FF2B5EF4-FFF2-40B4-BE49-F238E27FC236}">
+                      <a16:creationId xmlns:a16="http://schemas.microsoft.com/office/drawing/2014/main" id="{6AFB82AC-D276-416E-A622-24258514BEF0}"/>
+                    </a:ext>
+                  </a:extLst>
+                </p:cNvPr>
+                <p:cNvSpPr txBox="1"/>
+                <p:nvPr/>
+              </p:nvSpPr>
+              <p:spPr>
+                <a:xfrm>
+                  <a:off x="3903310" y="3881536"/>
+                  <a:ext cx="1430694" cy="646331"/>
+                </a:xfrm>
+                <a:prstGeom prst="rect">
+                  <a:avLst/>
+                </a:prstGeom>
+                <a:noFill/>
+              </p:spPr>
+              <p:txBody>
+                <a:bodyPr wrap="square" rtlCol="0">
+                  <a:spAutoFit/>
+                </a:bodyPr>
+                <a:lstStyle/>
+                <a:p>
+                  <a:r>
+                    <a:rPr lang="fr-FR" dirty="0"/>
+                    <a:t>Paramètre à l’itération </a:t>
+                  </a:r>
+                  <a14:m>
+                    <m:oMath xmlns:m="http://schemas.openxmlformats.org/officeDocument/2006/math">
+                      <m:r>
+                        <a:rPr lang="fr-FR" b="0" i="1" smtClean="0">
+                          <a:latin typeface="Cambria Math" panose="02040503050406030204" pitchFamily="18" charset="0"/>
+                        </a:rPr>
+                        <m:t>𝑘</m:t>
+                      </m:r>
+                    </m:oMath>
+                  </a14:m>
+                  <a:endParaRPr lang="fr-FR" dirty="0"/>
+                </a:p>
+              </p:txBody>
+            </p:sp>
+          </mc:Choice>
+          <mc:Fallback>
+            <p:sp>
+              <p:nvSpPr>
+                <p:cNvPr id="18" name="ZoneTexte 17">
+                  <a:extLst>
+                    <a:ext uri="{FF2B5EF4-FFF2-40B4-BE49-F238E27FC236}">
+                      <a16:creationId xmlns:a16="http://schemas.microsoft.com/office/drawing/2014/main" id="{6AFB82AC-D276-416E-A622-24258514BEF0}"/>
+                    </a:ext>
+                  </a:extLst>
+                </p:cNvPr>
+                <p:cNvSpPr txBox="1">
+                  <a:spLocks noRot="1" noChangeAspect="1" noMove="1" noResize="1" noEditPoints="1" noAdjustHandles="1" noChangeArrowheads="1" noChangeShapeType="1" noTextEdit="1"/>
+                </p:cNvSpPr>
+                <p:nvPr/>
+              </p:nvSpPr>
+              <p:spPr>
+                <a:xfrm>
+                  <a:off x="3903310" y="3881536"/>
+                  <a:ext cx="1430694" cy="646331"/>
+                </a:xfrm>
+                <a:prstGeom prst="rect">
+                  <a:avLst/>
+                </a:prstGeom>
+                <a:blipFill>
+                  <a:blip r:embed="rId7"/>
+                  <a:stretch>
+                    <a:fillRect l="-3846" t="-4717" b="-14151"/>
+                  </a:stretch>
+                </a:blipFill>
+              </p:spPr>
+              <p:txBody>
+                <a:bodyPr/>
+                <a:lstStyle/>
+                <a:p>
+                  <a:r>
+                    <a:rPr lang="fr-FR">
+                      <a:noFill/>
+                    </a:rPr>
+                    <a:t> </a:t>
+                  </a:r>
+                </a:p>
+              </p:txBody>
+            </p:sp>
+          </mc:Fallback>
+        </mc:AlternateContent>
+        <mc:AlternateContent xmlns:mc="http://schemas.openxmlformats.org/markup-compatibility/2006">
+          <mc:Choice xmlns:a14="http://schemas.microsoft.com/office/drawing/2010/main" Requires="a14">
+            <p:sp>
+              <p:nvSpPr>
+                <p:cNvPr id="19" name="ZoneTexte 18">
+                  <a:extLst>
+                    <a:ext uri="{FF2B5EF4-FFF2-40B4-BE49-F238E27FC236}">
+                      <a16:creationId xmlns:a16="http://schemas.microsoft.com/office/drawing/2014/main" id="{981348A6-A5D6-4363-8981-6C05180F79F6}"/>
+                    </a:ext>
+                  </a:extLst>
+                </p:cNvPr>
+                <p:cNvSpPr txBox="1"/>
+                <p:nvPr/>
+              </p:nvSpPr>
+              <p:spPr>
+                <a:xfrm>
+                  <a:off x="6885984" y="3825551"/>
+                  <a:ext cx="2724541" cy="499624"/>
+                </a:xfrm>
+                <a:prstGeom prst="rect">
+                  <a:avLst/>
+                </a:prstGeom>
+                <a:noFill/>
+              </p:spPr>
+              <p:txBody>
+                <a:bodyPr wrap="square" rtlCol="0">
+                  <a:spAutoFit/>
+                </a:bodyPr>
+                <a:lstStyle/>
+                <a:p>
+                  <a:r>
+                    <a:rPr lang="fr-FR" dirty="0"/>
+                    <a:t>Gradient (se note aussi </a:t>
+                  </a:r>
+                  <a14:m>
+                    <m:oMath xmlns:m="http://schemas.openxmlformats.org/officeDocument/2006/math">
+                      <m:f>
+                        <m:fPr>
+                          <m:ctrlPr>
+                            <a:rPr lang="fr-FR" b="0" i="1" smtClean="0">
+                              <a:latin typeface="Cambria Math" panose="02040503050406030204" pitchFamily="18" charset="0"/>
+                            </a:rPr>
+                          </m:ctrlPr>
+                        </m:fPr>
+                        <m:num>
+                          <m:r>
+                            <a:rPr lang="fr-FR" b="0" i="1" smtClean="0">
+                              <a:latin typeface="Cambria Math" panose="02040503050406030204" pitchFamily="18" charset="0"/>
+                            </a:rPr>
+                            <m:t>𝛿</m:t>
+                          </m:r>
+                          <m:r>
+                            <a:rPr lang="fr-FR" b="0" i="1" smtClean="0">
+                              <a:latin typeface="Cambria Math" panose="02040503050406030204" pitchFamily="18" charset="0"/>
+                            </a:rPr>
+                            <m:t>𝐿</m:t>
+                          </m:r>
+                        </m:num>
+                        <m:den>
+                          <m:r>
+                            <a:rPr lang="fr-FR" b="0" i="1" smtClean="0">
+                              <a:latin typeface="Cambria Math" panose="02040503050406030204" pitchFamily="18" charset="0"/>
+                            </a:rPr>
+                            <m:t>𝛿𝜃</m:t>
+                          </m:r>
+                        </m:den>
+                      </m:f>
+                    </m:oMath>
+                  </a14:m>
+                  <a:r>
+                    <a:rPr lang="fr-FR" dirty="0"/>
+                    <a:t>)</a:t>
+                  </a:r>
+                </a:p>
+              </p:txBody>
+            </p:sp>
+          </mc:Choice>
+          <mc:Fallback>
+            <p:sp>
+              <p:nvSpPr>
+                <p:cNvPr id="19" name="ZoneTexte 18">
+                  <a:extLst>
+                    <a:ext uri="{FF2B5EF4-FFF2-40B4-BE49-F238E27FC236}">
+                      <a16:creationId xmlns:a16="http://schemas.microsoft.com/office/drawing/2014/main" id="{981348A6-A5D6-4363-8981-6C05180F79F6}"/>
+                    </a:ext>
+                  </a:extLst>
+                </p:cNvPr>
+                <p:cNvSpPr txBox="1">
+                  <a:spLocks noRot="1" noChangeAspect="1" noMove="1" noResize="1" noEditPoints="1" noAdjustHandles="1" noChangeArrowheads="1" noChangeShapeType="1" noTextEdit="1"/>
+                </p:cNvSpPr>
+                <p:nvPr/>
+              </p:nvSpPr>
+              <p:spPr>
+                <a:xfrm>
+                  <a:off x="6885984" y="3825551"/>
+                  <a:ext cx="2724541" cy="499624"/>
+                </a:xfrm>
+                <a:prstGeom prst="rect">
+                  <a:avLst/>
+                </a:prstGeom>
+                <a:blipFill>
+                  <a:blip r:embed="rId8"/>
+                  <a:stretch>
+                    <a:fillRect l="-2013" b="-7317"/>
+                  </a:stretch>
+                </a:blipFill>
+              </p:spPr>
+              <p:txBody>
+                <a:bodyPr/>
+                <a:lstStyle/>
+                <a:p>
+                  <a:r>
+                    <a:rPr lang="fr-FR">
+                      <a:noFill/>
+                    </a:rPr>
+                    <a:t> </a:t>
+                  </a:r>
+                </a:p>
+              </p:txBody>
+            </p:sp>
+          </mc:Fallback>
+        </mc:AlternateContent>
+      </p:grpSp>
     </p:spTree>
     <p:extLst>
       <p:ext uri="{BB962C8B-B14F-4D97-AF65-F5344CB8AC3E}">
@@ -8359,7 +9493,12 @@
             <p:ph type="title"/>
           </p:nvPr>
         </p:nvSpPr>
-        <p:spPr/>
+        <p:spPr>
+          <a:xfrm>
+            <a:off x="838200" y="365125"/>
+            <a:ext cx="10515600" cy="2639332"/>
+          </a:xfrm>
+        </p:spPr>
         <p:txBody>
           <a:bodyPr/>
           <a:lstStyle/>
@@ -8368,6 +9507,28 @@
               <a:rPr lang="fr-FR" dirty="0"/>
               <a:t>3. Introduction aux réseaux de neurones</a:t>
             </a:r>
+            <a:br>
+              <a:rPr lang="fr-FR" dirty="0"/>
+            </a:br>
+            <a:r>
+              <a:rPr lang="fr-FR" sz="3200" dirty="0"/>
+              <a:t>	3.1. Problèmes de régression</a:t>
+            </a:r>
+            <a:br>
+              <a:rPr lang="fr-FR" sz="3200" dirty="0"/>
+            </a:br>
+            <a:r>
+              <a:rPr lang="fr-FR" sz="3200" dirty="0"/>
+              <a:t>	3.2. Descente de gradient, dérivation automatique</a:t>
+            </a:r>
+            <a:br>
+              <a:rPr lang="fr-FR" sz="3200" dirty="0"/>
+            </a:br>
+            <a:r>
+              <a:rPr lang="fr-FR" sz="3200" dirty="0"/>
+              <a:t>	3.3. Un réseau de neurones simple (MLP)</a:t>
+            </a:r>
+            <a:endParaRPr lang="fr-FR" dirty="0"/>
           </a:p>
         </p:txBody>
       </p:sp>
@@ -8399,7 +9560,7 @@
         </p:blipFill>
         <p:spPr>
           <a:xfrm>
-            <a:off x="4679888" y="2318100"/>
+            <a:off x="4723431" y="3375570"/>
             <a:ext cx="1904762" cy="2692063"/>
           </a:xfrm>
           <a:prstGeom prst="rect">
@@ -8471,8 +9632,8 @@
                   <a:buNone/>
                 </a:pPr>
                 <a:r>
-                  <a:rPr lang="fr-FR" sz="2200" dirty="0"/>
-                  <a:t>3.1 Problème de régression</a:t>
+                  <a:rPr lang="fr-FR" sz="2400" dirty="0"/>
+                  <a:t>3.1 Problèmes de régression</a:t>
                 </a:r>
               </a:p>
               <a:p>
@@ -8582,7 +9743,15 @@
                 </a14:m>
                 <a:r>
                   <a:rPr lang="fr-FR" sz="2200" dirty="0"/>
-                  <a:t> :</a:t>
+                  <a:t> (</a:t>
+                </a:r>
+                <a:r>
+                  <a:rPr lang="fr-FR" sz="2200" i="1" dirty="0" err="1"/>
+                  <a:t>loss</a:t>
+                </a:r>
+                <a:r>
+                  <a:rPr lang="fr-FR" sz="2200" dirty="0"/>
+                  <a:t>) :</a:t>
                 </a:r>
               </a:p>
               <a:p>
@@ -8647,7 +9816,7 @@
               <a:blipFill>
                 <a:blip r:embed="rId2"/>
                 <a:stretch>
-                  <a:fillRect l="-731" t="-1316"/>
+                  <a:fillRect l="-844" t="-1417"/>
                 </a:stretch>
               </a:blipFill>
             </p:spPr>
@@ -8686,8 +9855,8 @@
             <a:chExt cx="6097088" cy="1140288"/>
           </a:xfrm>
         </p:grpSpPr>
-        <mc:AlternateContent xmlns:mc="http://schemas.openxmlformats.org/markup-compatibility/2006">
-          <mc:Choice xmlns:a14="http://schemas.microsoft.com/office/drawing/2010/main" Requires="a14">
+        <mc:AlternateContent xmlns:mc="http://schemas.openxmlformats.org/markup-compatibility/2006" xmlns:a14="http://schemas.microsoft.com/office/drawing/2010/main">
+          <mc:Choice Requires="a14">
             <p:sp>
               <p:nvSpPr>
                 <p:cNvPr id="47" name="ZoneTexte 46">
@@ -8793,7 +9962,7 @@
               </p:txBody>
             </p:sp>
           </mc:Choice>
-          <mc:Fallback>
+          <mc:Fallback xmlns="">
             <p:sp>
               <p:nvSpPr>
                 <p:cNvPr id="47" name="ZoneTexte 46">
@@ -8838,8 +10007,8 @@
             </p:sp>
           </mc:Fallback>
         </mc:AlternateContent>
-        <mc:AlternateContent xmlns:mc="http://schemas.openxmlformats.org/markup-compatibility/2006">
-          <mc:Choice xmlns:a14="http://schemas.microsoft.com/office/drawing/2010/main" Requires="a14">
+        <mc:AlternateContent xmlns:mc="http://schemas.openxmlformats.org/markup-compatibility/2006" xmlns:a14="http://schemas.microsoft.com/office/drawing/2010/main">
+          <mc:Choice Requires="a14">
             <p:sp>
               <p:nvSpPr>
                 <p:cNvPr id="48" name="ZoneTexte 47">
@@ -8888,6 +10057,7 @@
                               <a:lumMod val="50000"/>
                             </a:schemeClr>
                           </a:solidFill>
+                          <a:latin typeface="Cambria Math" panose="02040503050406030204" pitchFamily="18" charset="0"/>
                         </a:rPr>
                         <m:t>h</m:t>
                       </m:r>
@@ -8921,7 +10091,7 @@
               </p:txBody>
             </p:sp>
           </mc:Choice>
-          <mc:Fallback>
+          <mc:Fallback xmlns="">
             <p:sp>
               <p:nvSpPr>
                 <p:cNvPr id="48" name="ZoneTexte 47">
@@ -8966,8 +10136,8 @@
             </p:sp>
           </mc:Fallback>
         </mc:AlternateContent>
-        <mc:AlternateContent xmlns:mc="http://schemas.openxmlformats.org/markup-compatibility/2006">
-          <mc:Choice xmlns:a14="http://schemas.microsoft.com/office/drawing/2010/main" Requires="a14">
+        <mc:AlternateContent xmlns:mc="http://schemas.openxmlformats.org/markup-compatibility/2006" xmlns:a14="http://schemas.microsoft.com/office/drawing/2010/main">
+          <mc:Choice Requires="a14">
             <p:sp>
               <p:nvSpPr>
                 <p:cNvPr id="49" name="ZoneTexte 48">
@@ -9016,6 +10186,7 @@
                               <a:lumMod val="50000"/>
                             </a:schemeClr>
                           </a:solidFill>
+                          <a:latin typeface="Cambria Math" panose="02040503050406030204" pitchFamily="18" charset="0"/>
                         </a:rPr>
                         <m:t>𝜃</m:t>
                       </m:r>
@@ -9048,7 +10219,7 @@
               </p:txBody>
             </p:sp>
           </mc:Choice>
-          <mc:Fallback>
+          <mc:Fallback xmlns="">
             <p:sp>
               <p:nvSpPr>
                 <p:cNvPr id="49" name="ZoneTexte 48">
@@ -9175,8 +10346,8 @@
             </a:fontRef>
           </p:style>
         </p:cxnSp>
-        <mc:AlternateContent xmlns:mc="http://schemas.openxmlformats.org/markup-compatibility/2006">
-          <mc:Choice xmlns:a14="http://schemas.microsoft.com/office/drawing/2010/main" Requires="a14">
+        <mc:AlternateContent xmlns:mc="http://schemas.openxmlformats.org/markup-compatibility/2006" xmlns:a14="http://schemas.microsoft.com/office/drawing/2010/main">
+          <mc:Choice Requires="a14">
             <p:sp>
               <p:nvSpPr>
                 <p:cNvPr id="52" name="ZoneTexte 51">
@@ -9224,12 +10395,13 @@
                         <m:accPr>
                           <m:chr m:val="̂"/>
                           <m:ctrlPr>
-                            <a:rPr lang="fr-FR" sz="1900" dirty="0">
+                            <a:rPr lang="fr-FR" sz="1900" i="1" dirty="0">
                               <a:solidFill>
                                 <a:schemeClr val="bg2">
                                   <a:lumMod val="50000"/>
                                 </a:schemeClr>
                               </a:solidFill>
+                              <a:latin typeface="Cambria Math" panose="02040503050406030204" pitchFamily="18" charset="0"/>
                             </a:rPr>
                           </m:ctrlPr>
                         </m:accPr>
@@ -9241,6 +10413,7 @@
                                   <a:lumMod val="50000"/>
                                 </a:schemeClr>
                               </a:solidFill>
+                              <a:latin typeface="Cambria Math" panose="02040503050406030204" pitchFamily="18" charset="0"/>
                             </a:rPr>
                             <m:t>𝑦</m:t>
                           </m:r>
@@ -9277,7 +10450,7 @@
               </p:txBody>
             </p:sp>
           </mc:Choice>
-          <mc:Fallback>
+          <mc:Fallback xmlns="">
             <p:sp>
               <p:nvSpPr>
                 <p:cNvPr id="52" name="ZoneTexte 51">
@@ -9384,8 +10557,8 @@
             <a:chExt cx="6408957" cy="932538"/>
           </a:xfrm>
         </p:grpSpPr>
-        <mc:AlternateContent xmlns:mc="http://schemas.openxmlformats.org/markup-compatibility/2006">
-          <mc:Choice xmlns:a14="http://schemas.microsoft.com/office/drawing/2010/main" Requires="a14">
+        <mc:AlternateContent xmlns:mc="http://schemas.openxmlformats.org/markup-compatibility/2006" xmlns:a14="http://schemas.microsoft.com/office/drawing/2010/main">
+          <mc:Choice Requires="a14">
             <p:sp>
               <p:nvSpPr>
                 <p:cNvPr id="55" name="ZoneTexte 54">
@@ -9509,7 +10682,7 @@
               </p:txBody>
             </p:sp>
           </mc:Choice>
-          <mc:Fallback>
+          <mc:Fallback xmlns="">
             <p:sp>
               <p:nvSpPr>
                 <p:cNvPr id="55" name="ZoneTexte 54">
@@ -9755,8 +10928,8 @@
           <a:chExt cx="0" cy="0"/>
         </a:xfrm>
       </p:grpSpPr>
-      <mc:AlternateContent xmlns:mc="http://schemas.openxmlformats.org/markup-compatibility/2006">
-        <mc:Choice xmlns:a14="http://schemas.microsoft.com/office/drawing/2010/main" Requires="a14">
+      <mc:AlternateContent xmlns:mc="http://schemas.openxmlformats.org/markup-compatibility/2006" xmlns:a14="http://schemas.microsoft.com/office/drawing/2010/main">
+        <mc:Choice Requires="a14">
           <p:sp>
             <p:nvSpPr>
               <p:cNvPr id="3" name="Espace réservé du contenu 2">
@@ -10553,7 +11726,7 @@
             </p:txBody>
           </p:sp>
         </mc:Choice>
-        <mc:Fallback>
+        <mc:Fallback xmlns="">
           <p:sp>
             <p:nvSpPr>
               <p:cNvPr id="3" name="Espace réservé du contenu 2">
@@ -10848,8 +12021,8 @@
               </a:fontRef>
             </p:style>
           </p:cxnSp>
-          <mc:AlternateContent xmlns:mc="http://schemas.openxmlformats.org/markup-compatibility/2006">
-            <mc:Choice xmlns:a14="http://schemas.microsoft.com/office/drawing/2010/main" Requires="a14">
+          <mc:AlternateContent xmlns:mc="http://schemas.openxmlformats.org/markup-compatibility/2006" xmlns:a14="http://schemas.microsoft.com/office/drawing/2010/main">
+            <mc:Choice Requires="a14">
               <p:sp>
                 <p:nvSpPr>
                   <p:cNvPr id="38" name="ZoneTexte 37">
@@ -10997,7 +12170,7 @@
                 </p:txBody>
               </p:sp>
             </mc:Choice>
-            <mc:Fallback>
+            <mc:Fallback xmlns="">
               <p:sp>
                 <p:nvSpPr>
                   <p:cNvPr id="38" name="ZoneTexte 37">

</xml_diff>